<commit_message>
adding user's guide in Russian
</commit_message>
<xml_diff>
--- a/Presentation.pptx
+++ b/Presentation.pptx
@@ -6890,20 +6890,16 @@
           </a:bodyPr>
           <a:lstStyle/>
           <a:p>
-            <a:pPr algn="just"/>
-            <a:r>
-              <a:rPr kumimoji="1" lang="ru-RU" altLang="ja-JP" sz="1700" dirty="0">
-                <a:latin typeface="Times"/>
-                <a:cs typeface="Times"/>
-              </a:rPr>
-              <a:t>2</a:t>
-            </a:r>
+            <a:pPr marL="285750" indent="-285750" algn="just">
+              <a:buFont typeface="Wingdings" charset="2"/>
+              <a:buChar char="Ø"/>
+            </a:pPr>
             <a:r>
               <a:rPr kumimoji="1" lang="ru-RU" altLang="ja-JP" sz="1700" dirty="0" smtClean="0">
                 <a:latin typeface="Times"/>
                 <a:cs typeface="Times"/>
               </a:rPr>
-              <a:t>. Со</a:t>
+              <a:t>Со</a:t>
             </a:r>
             <a:r>
               <a:rPr kumimoji="1" lang="ru-RU" altLang="ja-JP" sz="1700" i="1" dirty="0" smtClean="0">
@@ -6963,28 +6959,20 @@
             </a:r>
           </a:p>
           <a:p>
-            <a:pPr algn="just"/>
+            <a:pPr marL="285750" indent="-285750" algn="just">
+              <a:buFont typeface="Wingdings" charset="2"/>
+              <a:buChar char="Ø"/>
+            </a:pPr>
             <a:endParaRPr kumimoji="1" lang="ru-RU" altLang="ja-JP" sz="1700" b="1" dirty="0">
               <a:latin typeface="Times"/>
               <a:cs typeface="Times"/>
             </a:endParaRPr>
           </a:p>
           <a:p>
-            <a:pPr algn="just"/>
-            <a:r>
-              <a:rPr kumimoji="1" lang="ru-RU" altLang="ja-JP" sz="1700" dirty="0" smtClean="0">
-                <a:latin typeface="Times"/>
-                <a:cs typeface="Times"/>
-              </a:rPr>
-              <a:t>3.</a:t>
-            </a:r>
-            <a:r>
-              <a:rPr kumimoji="1" lang="ru-RU" altLang="ja-JP" sz="1700" b="1" dirty="0" smtClean="0">
-                <a:latin typeface="Times"/>
-                <a:cs typeface="Times"/>
-              </a:rPr>
-              <a:t> </a:t>
-            </a:r>
+            <a:pPr marL="285750" indent="-285750" algn="just">
+              <a:buFont typeface="Wingdings" charset="2"/>
+              <a:buChar char="Ø"/>
+            </a:pPr>
             <a:r>
               <a:rPr kumimoji="1" lang="ru-RU" altLang="ja-JP" sz="1700" dirty="0" smtClean="0">
                 <a:latin typeface="Times"/>
@@ -7144,21 +7132,10 @@
           </a:bodyPr>
           <a:lstStyle/>
           <a:p>
-            <a:pPr algn="just"/>
-            <a:r>
-              <a:rPr kumimoji="1" lang="ru-RU" altLang="ja-JP" dirty="0" smtClean="0">
-                <a:latin typeface="Times"/>
-                <a:cs typeface="Times"/>
-              </a:rPr>
-              <a:t>4.</a:t>
-            </a:r>
-            <a:r>
-              <a:rPr kumimoji="1" lang="en-US" altLang="ja-JP" dirty="0" smtClean="0">
-                <a:latin typeface="Times"/>
-                <a:cs typeface="Times"/>
-              </a:rPr>
-              <a:t> </a:t>
-            </a:r>
+            <a:pPr marL="285750" indent="-285750" algn="just">
+              <a:buFont typeface="Wingdings" charset="2"/>
+              <a:buChar char="Ø"/>
+            </a:pPr>
             <a:r>
               <a:rPr kumimoji="1" lang="ru-RU" altLang="ja-JP" dirty="0" smtClean="0">
                 <a:latin typeface="Times"/>
@@ -8440,6 +8417,13 @@
               <a:t>Course</a:t>
             </a:r>
             <a:r>
+              <a:rPr kumimoji="1" lang="ja-JP" altLang="ja-JP" sz="1700" b="1" dirty="0">
+                <a:latin typeface="Times"/>
+                <a:cs typeface="Times"/>
+              </a:rPr>
+              <a:t>s</a:t>
+            </a:r>
+            <a:r>
               <a:rPr kumimoji="1" lang="ja-JP" altLang="en-US" sz="1700" b="1" dirty="0" smtClean="0">
                 <a:latin typeface="Times"/>
                 <a:cs typeface="Times"/>
@@ -8482,6 +8466,13 @@
               <a:t>Course</a:t>
             </a:r>
             <a:r>
+              <a:rPr kumimoji="1" lang="en-US" altLang="ja-JP" sz="1700" b="1" dirty="0" smtClean="0">
+                <a:latin typeface="Times"/>
+                <a:cs typeface="Times"/>
+              </a:rPr>
+              <a:t>s</a:t>
+            </a:r>
+            <a:r>
               <a:rPr kumimoji="1" lang="ja-JP" altLang="en-US" sz="1700" b="1" dirty="0" smtClean="0">
                 <a:latin typeface="Times"/>
                 <a:cs typeface="Times"/>
@@ -8522,6 +8513,13 @@
                 <a:cs typeface="Times"/>
               </a:rPr>
               <a:t>Course</a:t>
+            </a:r>
+            <a:r>
+              <a:rPr kumimoji="1" lang="en-US" altLang="ja-JP" sz="1700" b="1" dirty="0" smtClean="0">
+                <a:latin typeface="Times"/>
+                <a:cs typeface="Times"/>
+              </a:rPr>
+              <a:t>s</a:t>
             </a:r>
             <a:r>
               <a:rPr kumimoji="1" lang="ja-JP" altLang="en-US" sz="1700" b="1" dirty="0" smtClean="0">
@@ -8586,11 +8584,18 @@
               <a:t>На этих страницах вы можете также посмотреть статистику сайта: </a:t>
             </a:r>
             <a:r>
+              <a:rPr kumimoji="1" lang="ru-RU" altLang="ja-JP" sz="1700" i="1" dirty="0">
+                <a:latin typeface="Times"/>
+                <a:cs typeface="Times"/>
+              </a:rPr>
+              <a:t>количество</a:t>
+            </a:r>
+            <a:r>
               <a:rPr kumimoji="1" lang="ru-RU" altLang="ja-JP" sz="1700" dirty="0">
                 <a:latin typeface="Times"/>
                 <a:cs typeface="Times"/>
               </a:rPr>
-              <a:t>количество курсов, учителей, категорий</a:t>
+              <a:t> курсов, учителей, категорий</a:t>
             </a:r>
             <a:r>
               <a:rPr kumimoji="1" lang="en-US" altLang="ja-JP" sz="1700" dirty="0">
@@ -8795,6 +8800,13 @@
               <a:t>Course</a:t>
             </a:r>
             <a:r>
+              <a:rPr kumimoji="1" lang="en-US" altLang="ja-JP" sz="1700" b="1" dirty="0" smtClean="0">
+                <a:latin typeface="Times"/>
+                <a:cs typeface="Times"/>
+              </a:rPr>
+              <a:t>s</a:t>
+            </a:r>
+            <a:r>
               <a:rPr kumimoji="1" lang="ja-JP" altLang="en-US" sz="1700" b="1" dirty="0" smtClean="0">
                 <a:latin typeface="Times"/>
                 <a:cs typeface="Times"/>
@@ -8835,6 +8847,13 @@
                 <a:cs typeface="Times"/>
               </a:rPr>
               <a:t>Course</a:t>
+            </a:r>
+            <a:r>
+              <a:rPr kumimoji="1" lang="en-US" altLang="ja-JP" sz="1700" b="1" dirty="0" smtClean="0">
+                <a:latin typeface="Times"/>
+                <a:cs typeface="Times"/>
+              </a:rPr>
+              <a:t>s</a:t>
             </a:r>
             <a:r>
               <a:rPr kumimoji="1" lang="ja-JP" altLang="en-US" sz="1700" b="1" dirty="0" smtClean="0">
@@ -9206,56 +9225,70 @@
               <a:t> </a:t>
             </a:r>
             <a:r>
+              <a:rPr kumimoji="1" lang="en-US" altLang="ja-JP" sz="1700" b="1" dirty="0" smtClean="0">
+                <a:latin typeface="Times"/>
+                <a:cs typeface="Times"/>
+              </a:rPr>
+              <a:t>Course</a:t>
+            </a:r>
+            <a:r>
+              <a:rPr kumimoji="1" lang="en-US" altLang="ja-JP" sz="1700" b="1" dirty="0" smtClean="0">
+                <a:latin typeface="Times"/>
+                <a:cs typeface="Times"/>
+              </a:rPr>
+              <a:t>s</a:t>
+            </a:r>
+            <a:r>
+              <a:rPr kumimoji="1" lang="ja-JP" altLang="en-US" sz="1700" b="1" dirty="0" smtClean="0">
+                <a:latin typeface="Times"/>
+                <a:cs typeface="Times"/>
+              </a:rPr>
+              <a:t> </a:t>
+            </a:r>
+            <a:r>
               <a:rPr kumimoji="1" lang="en-US" altLang="ja-JP" sz="1700" b="1" dirty="0">
                 <a:latin typeface="Times"/>
                 <a:cs typeface="Times"/>
               </a:rPr>
+              <a:t>by</a:t>
+            </a:r>
+            <a:r>
+              <a:rPr kumimoji="1" lang="ja-JP" altLang="en-US" sz="1700" b="1" dirty="0">
+                <a:latin typeface="Times"/>
+                <a:cs typeface="Times"/>
+              </a:rPr>
+              <a:t> </a:t>
+            </a:r>
+            <a:r>
+              <a:rPr kumimoji="1" lang="en-US" altLang="ja-JP" sz="1700" b="1" dirty="0">
+                <a:latin typeface="Times"/>
+                <a:cs typeface="Times"/>
+              </a:rPr>
+              <a:t>Name,</a:t>
+            </a:r>
+            <a:r>
+              <a:rPr kumimoji="1" lang="ja-JP" altLang="en-US" sz="1700" b="1" dirty="0">
+                <a:latin typeface="Times"/>
+                <a:cs typeface="Times"/>
+              </a:rPr>
+              <a:t> </a:t>
+            </a:r>
+            <a:r>
+              <a:rPr kumimoji="1" lang="en-US" altLang="ja-JP" sz="1700" b="1" dirty="0" smtClean="0">
+                <a:latin typeface="Times"/>
+                <a:cs typeface="Times"/>
+              </a:rPr>
               <a:t>Course</a:t>
             </a:r>
             <a:r>
-              <a:rPr kumimoji="1" lang="ja-JP" altLang="en-US" sz="1700" b="1" dirty="0">
-                <a:latin typeface="Times"/>
-                <a:cs typeface="Times"/>
-              </a:rPr>
-              <a:t> </a:t>
-            </a:r>
-            <a:r>
-              <a:rPr kumimoji="1" lang="en-US" altLang="ja-JP" sz="1700" b="1" dirty="0">
-                <a:latin typeface="Times"/>
-                <a:cs typeface="Times"/>
-              </a:rPr>
-              <a:t>by</a:t>
-            </a:r>
-            <a:r>
-              <a:rPr kumimoji="1" lang="ja-JP" altLang="en-US" sz="1700" b="1" dirty="0">
-                <a:latin typeface="Times"/>
-                <a:cs typeface="Times"/>
-              </a:rPr>
-              <a:t> </a:t>
-            </a:r>
-            <a:r>
-              <a:rPr kumimoji="1" lang="en-US" altLang="ja-JP" sz="1700" b="1" dirty="0">
-                <a:latin typeface="Times"/>
-                <a:cs typeface="Times"/>
-              </a:rPr>
-              <a:t>Name,</a:t>
-            </a:r>
-            <a:r>
-              <a:rPr kumimoji="1" lang="ja-JP" altLang="en-US" sz="1700" b="1" dirty="0">
-                <a:latin typeface="Times"/>
-                <a:cs typeface="Times"/>
-              </a:rPr>
-              <a:t> </a:t>
-            </a:r>
-            <a:r>
-              <a:rPr kumimoji="1" lang="en-US" altLang="ja-JP" sz="1700" b="1" dirty="0">
-                <a:latin typeface="Times"/>
-                <a:cs typeface="Times"/>
-              </a:rPr>
-              <a:t>Course</a:t>
-            </a:r>
-            <a:r>
-              <a:rPr kumimoji="1" lang="ja-JP" altLang="en-US" sz="1700" b="1" dirty="0">
+              <a:rPr kumimoji="1" lang="en-US" altLang="ja-JP" sz="1700" b="1" dirty="0" smtClean="0">
+                <a:latin typeface="Times"/>
+                <a:cs typeface="Times"/>
+              </a:rPr>
+              <a:t>s</a:t>
+            </a:r>
+            <a:r>
+              <a:rPr kumimoji="1" lang="ja-JP" altLang="en-US" sz="1700" b="1" dirty="0" smtClean="0">
                 <a:latin typeface="Times"/>
                 <a:cs typeface="Times"/>
               </a:rPr>
@@ -9314,7 +9347,21 @@
                 <a:latin typeface="Times"/>
                 <a:cs typeface="Times"/>
               </a:rPr>
-              <a:t>На этих страницах вы можете также посмотреть статистику сайта: количество курсов, учителей, категорий</a:t>
+              <a:t>На этих страницах вы можете также посмотреть статистику сайта: </a:t>
+            </a:r>
+            <a:r>
+              <a:rPr kumimoji="1" lang="ru-RU" altLang="ja-JP" sz="1700" i="1" dirty="0">
+                <a:latin typeface="Times"/>
+                <a:cs typeface="Times"/>
+              </a:rPr>
+              <a:t>количество</a:t>
+            </a:r>
+            <a:r>
+              <a:rPr kumimoji="1" lang="ru-RU" altLang="ja-JP" sz="1700" dirty="0">
+                <a:latin typeface="Times"/>
+                <a:cs typeface="Times"/>
+              </a:rPr>
+              <a:t> курсов, учителей, категорий</a:t>
             </a:r>
             <a:r>
               <a:rPr kumimoji="1" lang="en-US" altLang="ja-JP" sz="1700" dirty="0">
@@ -9557,18 +9604,18 @@
               <a:t>Нажмите </a:t>
             </a:r>
             <a:r>
-              <a:rPr kumimoji="1" lang="en-US" altLang="ja-JP" sz="1500" b="1" dirty="0" err="1" smtClean="0">
-                <a:latin typeface="Times"/>
-                <a:cs typeface="Times"/>
-              </a:rPr>
-              <a:t>Uploa</a:t>
+              <a:rPr kumimoji="1" lang="en-US" altLang="ja-JP" sz="1500" b="1" dirty="0" smtClean="0">
+                <a:latin typeface="Times"/>
+                <a:cs typeface="Times"/>
+              </a:rPr>
+              <a:t>Upload</a:t>
             </a:r>
             <a:r>
               <a:rPr kumimoji="1" lang="ja-JP" altLang="en-US" sz="1500" b="1" dirty="0" smtClean="0">
                 <a:latin typeface="Times"/>
                 <a:cs typeface="Times"/>
               </a:rPr>
-              <a:t>d </a:t>
+              <a:t> </a:t>
             </a:r>
             <a:r>
               <a:rPr kumimoji="1" lang="en-US" altLang="ja-JP" sz="1500" b="1" dirty="0" smtClean="0">
@@ -9599,18 +9646,32 @@
               <a:t> </a:t>
             </a:r>
             <a:r>
+              <a:rPr kumimoji="1" lang="ru-RU" altLang="ja-JP" sz="1500" dirty="0" smtClean="0">
+                <a:latin typeface="Times"/>
+                <a:cs typeface="Times"/>
+              </a:rPr>
+              <a:t>загрузит</a:t>
+            </a:r>
+            <a:r>
               <a:rPr kumimoji="1" lang="ru-RU" altLang="ja-JP" sz="1500" dirty="0">
                 <a:latin typeface="Times"/>
                 <a:cs typeface="Times"/>
               </a:rPr>
-              <a:t>з</a:t>
+              <a:t>ь</a:t>
             </a:r>
             <a:r>
               <a:rPr kumimoji="1" lang="ru-RU" altLang="ja-JP" sz="1500" dirty="0" smtClean="0">
                 <a:latin typeface="Times"/>
                 <a:cs typeface="Times"/>
               </a:rPr>
-              <a:t>агрузите новую фотографию для курса. В разделе </a:t>
+              <a:t> </a:t>
+            </a:r>
+            <a:r>
+              <a:rPr kumimoji="1" lang="ru-RU" altLang="ja-JP" sz="1500" dirty="0" smtClean="0">
+                <a:latin typeface="Times"/>
+                <a:cs typeface="Times"/>
+              </a:rPr>
+              <a:t>новую фотографию для курса. В разделе </a:t>
             </a:r>
             <a:r>
               <a:rPr kumimoji="1" lang="en-US" altLang="ja-JP" sz="1500" i="1" dirty="0" smtClean="0">
@@ -10098,8 +10159,12 @@
                 <a:latin typeface="Times"/>
                 <a:cs typeface="Times"/>
               </a:rPr>
-              <a:t>сохранить</a:t>
-            </a:r>
+              <a:t>сохранить.</a:t>
+            </a:r>
+            <a:endParaRPr kumimoji="1" lang="ru-RU" altLang="ja-JP" sz="1500" dirty="0" smtClean="0">
+              <a:latin typeface="Times"/>
+              <a:cs typeface="Times"/>
+            </a:endParaRPr>
           </a:p>
           <a:p>
             <a:pPr marL="285750" indent="-285750" algn="just">
@@ -10594,13 +10659,83 @@
               <a:t>Вернитесь на страницу </a:t>
             </a:r>
             <a:r>
+              <a:rPr kumimoji="1" lang="en-US" altLang="ja-JP" b="1" dirty="0" smtClean="0">
+                <a:latin typeface="Times"/>
+                <a:cs typeface="Times"/>
+              </a:rPr>
+              <a:t>Course</a:t>
+            </a:r>
+            <a:r>
+              <a:rPr kumimoji="1" lang="ja-JP" altLang="ja-JP" b="1" dirty="0">
+                <a:latin typeface="Times"/>
+                <a:cs typeface="Times"/>
+              </a:rPr>
+              <a:t>s</a:t>
+            </a:r>
+            <a:r>
+              <a:rPr kumimoji="1" lang="ja-JP" altLang="en-US" b="1" dirty="0" smtClean="0">
+                <a:latin typeface="Times"/>
+                <a:cs typeface="Times"/>
+              </a:rPr>
+              <a:t> </a:t>
+            </a:r>
+            <a:r>
               <a:rPr kumimoji="1" lang="en-US" altLang="ja-JP" b="1" dirty="0">
                 <a:latin typeface="Times"/>
                 <a:cs typeface="Times"/>
               </a:rPr>
+              <a:t>by</a:t>
+            </a:r>
+            <a:r>
+              <a:rPr kumimoji="1" lang="ja-JP" altLang="en-US" b="1" dirty="0">
+                <a:latin typeface="Times"/>
+                <a:cs typeface="Times"/>
+              </a:rPr>
+              <a:t> </a:t>
+            </a:r>
+            <a:r>
+              <a:rPr kumimoji="1" lang="en-US" altLang="ja-JP" b="1" dirty="0">
+                <a:latin typeface="Times"/>
+                <a:cs typeface="Times"/>
+              </a:rPr>
+              <a:t>Category,</a:t>
+            </a:r>
+            <a:r>
+              <a:rPr kumimoji="1" lang="ja-JP" altLang="en-US" b="1" dirty="0">
+                <a:latin typeface="Times"/>
+                <a:cs typeface="Times"/>
+              </a:rPr>
+              <a:t> </a:t>
+            </a:r>
+            <a:r>
+              <a:rPr kumimoji="1" lang="en-US" altLang="ja-JP" b="1" dirty="0" smtClean="0">
+                <a:latin typeface="Times"/>
+                <a:cs typeface="Times"/>
+              </a:rPr>
               <a:t>Course</a:t>
             </a:r>
             <a:r>
+              <a:rPr kumimoji="1" lang="en-US" altLang="ja-JP" b="1" dirty="0" smtClean="0">
+                <a:latin typeface="Times"/>
+                <a:cs typeface="Times"/>
+              </a:rPr>
+              <a:t>s</a:t>
+            </a:r>
+            <a:r>
+              <a:rPr kumimoji="1" lang="ja-JP" altLang="en-US" b="1" dirty="0" smtClean="0">
+                <a:latin typeface="Times"/>
+                <a:cs typeface="Times"/>
+              </a:rPr>
+              <a:t> </a:t>
+            </a:r>
+            <a:r>
+              <a:rPr kumimoji="1" lang="en-US" altLang="ja-JP" b="1" dirty="0">
+                <a:latin typeface="Times"/>
+                <a:cs typeface="Times"/>
+              </a:rPr>
+              <a:t>by</a:t>
+            </a:r>
+            <a:r>
               <a:rPr kumimoji="1" lang="ja-JP" altLang="en-US" b="1" dirty="0">
                 <a:latin typeface="Times"/>
                 <a:cs typeface="Times"/>
@@ -10612,7 +10747,7 @@
                 <a:latin typeface="Times"/>
                 <a:cs typeface="Times"/>
               </a:rPr>
-              <a:t>by</a:t>
+              <a:t>Name</a:t>
             </a:r>
             <a:r>
               <a:rPr kumimoji="1" lang="ja-JP" altLang="en-US" b="1" dirty="0">
@@ -10622,77 +10757,28 @@
               <a:t> </a:t>
             </a:r>
             <a:r>
-              <a:rPr kumimoji="1" lang="en-US" altLang="ja-JP" b="1" dirty="0">
-                <a:latin typeface="Times"/>
-                <a:cs typeface="Times"/>
-              </a:rPr>
-              <a:t>Category,</a:t>
-            </a:r>
-            <a:r>
-              <a:rPr kumimoji="1" lang="ja-JP" altLang="en-US" b="1" dirty="0">
-                <a:latin typeface="Times"/>
-                <a:cs typeface="Times"/>
-              </a:rPr>
-              <a:t> </a:t>
-            </a:r>
-            <a:r>
-              <a:rPr kumimoji="1" lang="en-US" altLang="ja-JP" b="1" dirty="0">
+              <a:rPr kumimoji="1" lang="ru-RU" altLang="ja-JP" dirty="0">
+                <a:latin typeface="Times"/>
+                <a:cs typeface="Times"/>
+              </a:rPr>
+              <a:t>или </a:t>
+            </a:r>
+            <a:r>
+              <a:rPr kumimoji="1" lang="en-US" altLang="ja-JP" b="1" dirty="0" smtClean="0">
                 <a:latin typeface="Times"/>
                 <a:cs typeface="Times"/>
               </a:rPr>
               <a:t>Course</a:t>
             </a:r>
             <a:r>
-              <a:rPr kumimoji="1" lang="ja-JP" altLang="en-US" b="1" dirty="0">
-                <a:latin typeface="Times"/>
-                <a:cs typeface="Times"/>
-              </a:rPr>
-              <a:t> </a:t>
-            </a:r>
-            <a:r>
-              <a:rPr kumimoji="1" lang="en-US" altLang="ja-JP" b="1" dirty="0">
-                <a:latin typeface="Times"/>
-                <a:cs typeface="Times"/>
-              </a:rPr>
-              <a:t>by</a:t>
-            </a:r>
-            <a:r>
-              <a:rPr kumimoji="1" lang="ja-JP" altLang="en-US" b="1" dirty="0">
-                <a:latin typeface="Times"/>
-                <a:cs typeface="Times"/>
-              </a:rPr>
-              <a:t> </a:t>
-            </a:r>
-            <a:r>
-              <a:rPr kumimoji="1" lang="en-US" altLang="ja-JP" b="1" dirty="0">
-                <a:latin typeface="Times"/>
-                <a:cs typeface="Times"/>
-              </a:rPr>
-              <a:t>Name</a:t>
-            </a:r>
-            <a:r>
-              <a:rPr kumimoji="1" lang="ja-JP" altLang="en-US" b="1" dirty="0">
-                <a:latin typeface="Times"/>
-                <a:cs typeface="Times"/>
-              </a:rPr>
-              <a:t> </a:t>
-            </a:r>
-            <a:r>
-              <a:rPr kumimoji="1" lang="ru-RU" altLang="ja-JP" dirty="0">
-                <a:latin typeface="Times"/>
-                <a:cs typeface="Times"/>
-              </a:rPr>
-              <a:t>или </a:t>
-            </a:r>
-            <a:r>
-              <a:rPr kumimoji="1" lang="en-US" altLang="ja-JP" b="1" dirty="0">
-                <a:latin typeface="Times"/>
-                <a:cs typeface="Times"/>
-              </a:rPr>
-              <a:t>Course</a:t>
-            </a:r>
-            <a:r>
-              <a:rPr kumimoji="1" lang="ja-JP" altLang="en-US" b="1" dirty="0">
+              <a:rPr kumimoji="1" lang="en-US" altLang="ja-JP" b="1" dirty="0" smtClean="0">
+                <a:latin typeface="Times"/>
+                <a:cs typeface="Times"/>
+              </a:rPr>
+              <a:t>s</a:t>
+            </a:r>
+            <a:r>
+              <a:rPr kumimoji="1" lang="ja-JP" altLang="en-US" b="1" dirty="0" smtClean="0">
                 <a:latin typeface="Times"/>
                 <a:cs typeface="Times"/>
               </a:rPr>
@@ -10935,7 +11021,7 @@
         <p:spPr>
           <a:xfrm>
             <a:off x="0" y="721466"/>
-            <a:ext cx="9144000" cy="2031325"/>
+            <a:ext cx="9144000" cy="2585323"/>
           </a:xfrm>
           <a:prstGeom prst="rect">
             <a:avLst/>
@@ -11027,6 +11113,13 @@
                 <a:cs typeface="Times"/>
               </a:rPr>
               <a:t>Subscription</a:t>
+            </a:r>
+            <a:r>
+              <a:rPr kumimoji="1" lang="en-US" altLang="ja-JP" b="1" dirty="0" smtClean="0">
+                <a:latin typeface="Times"/>
+                <a:cs typeface="Times"/>
+              </a:rPr>
+              <a:t>s</a:t>
             </a:r>
             <a:r>
               <a:rPr kumimoji="1" lang="ja-JP" altLang="en-US" b="1" dirty="0" smtClean="0">
@@ -11160,18 +11253,25 @@
               <a:t>заполните предложенную форму и нажмите </a:t>
             </a:r>
             <a:r>
-              <a:rPr kumimoji="1" lang="ru-RU" altLang="ja-JP" b="1" dirty="0" smtClean="0">
-                <a:latin typeface="Times"/>
-                <a:cs typeface="Times"/>
-              </a:rPr>
-              <a:t>С</a:t>
-            </a:r>
-            <a:r>
-              <a:rPr kumimoji="1" lang="en-US" altLang="ja-JP" b="1" dirty="0" err="1" smtClean="0">
-                <a:latin typeface="Times"/>
-                <a:cs typeface="Times"/>
-              </a:rPr>
-              <a:t>reate</a:t>
+              <a:rPr kumimoji="1" lang="ru-RU" altLang="ja-JP" dirty="0">
+                <a:latin typeface="Times"/>
+                <a:cs typeface="Times"/>
+              </a:rPr>
+              <a:t>На странице каталога, чтобы выбрать курс, воспользуйтесь выпадающим окном: выберите категорию и </a:t>
+            </a:r>
+            <a:r>
+              <a:rPr kumimoji="1" lang="ru-RU" altLang="ja-JP">
+                <a:latin typeface="Times"/>
+                <a:cs typeface="Times"/>
+              </a:rPr>
+              <a:t>нажмите  </a:t>
+            </a:r>
+            <a:r>
+              <a:rPr kumimoji="1" lang="en-US" altLang="ja-JP" b="1" smtClean="0">
+                <a:latin typeface="Times"/>
+                <a:cs typeface="Times"/>
+              </a:rPr>
+              <a:t>Create</a:t>
             </a:r>
             <a:r>
               <a:rPr kumimoji="1" lang="ru-RU" altLang="ja-JP" dirty="0" smtClean="0">
@@ -11208,8 +11308,8 @@
         </p:blipFill>
         <p:spPr>
           <a:xfrm>
-            <a:off x="0" y="3210003"/>
-            <a:ext cx="9144000" cy="3647997"/>
+            <a:off x="0" y="3862917"/>
+            <a:ext cx="9144000" cy="2995083"/>
           </a:xfrm>
           <a:prstGeom prst="rect">
             <a:avLst/>
@@ -11728,11 +11828,25 @@
               <a:t>HTML</a:t>
             </a:r>
             <a:r>
+              <a:rPr lang="en-US" altLang="ja-JP" sz="2000" b="0" dirty="0" smtClean="0">
+                <a:latin typeface="Times"/>
+                <a:cs typeface="Times"/>
+              </a:rPr>
+              <a:t>5</a:t>
+            </a:r>
+            <a:r>
+              <a:rPr lang="en-US" altLang="ja-JP" sz="2000" b="0" dirty="0" smtClean="0">
+                <a:latin typeface="Times"/>
+                <a:cs typeface="Times"/>
+              </a:rPr>
+              <a:t>, CSS, </a:t>
+            </a:r>
+            <a:r>
               <a:rPr lang="en-US" altLang="ja-JP" sz="2000" b="0" dirty="0">
                 <a:latin typeface="Times"/>
                 <a:cs typeface="Times"/>
               </a:rPr>
-              <a:t>, CSS, JavaScript, </a:t>
+              <a:t>JavaScript, </a:t>
             </a:r>
             <a:r>
               <a:rPr lang="en-US" altLang="ja-JP" sz="2000" b="0" dirty="0" err="1" smtClean="0">
@@ -12495,21 +12609,28 @@
                 <a:latin typeface="Times"/>
                 <a:cs typeface="Times"/>
               </a:rPr>
-              <a:t>Стрелка          , расположенная в центре внизу разделов на главной</a:t>
-            </a:r>
-            <a:r>
-              <a:rPr kumimoji="1" lang="en-US" altLang="ja-JP" sz="1700" dirty="0" smtClean="0">
-                <a:latin typeface="Times"/>
-                <a:cs typeface="Times"/>
-              </a:rPr>
-              <a:t> </a:t>
+              <a:t>Стрелка          , расположенная </a:t>
             </a:r>
             <a:r>
               <a:rPr kumimoji="1" lang="ru-RU" altLang="ja-JP" sz="1700" dirty="0" smtClean="0">
                 <a:latin typeface="Times"/>
                 <a:cs typeface="Times"/>
               </a:rPr>
-              <a:t> странице, предназначена для перехода по якорю к следующему разделу главной страницы. </a:t>
+              <a:t>снизу у нижнего края </a:t>
+            </a:r>
+            <a:r>
+              <a:rPr kumimoji="1" lang="ru-RU" altLang="ja-JP" sz="1700" dirty="0" smtClean="0">
+                <a:latin typeface="Times"/>
+                <a:cs typeface="Times"/>
+              </a:rPr>
+              <a:t>разделов главной страницы, </a:t>
+            </a:r>
+            <a:r>
+              <a:rPr kumimoji="1" lang="ru-RU" altLang="ja-JP" sz="1700" dirty="0" smtClean="0">
+                <a:latin typeface="Times"/>
+                <a:cs typeface="Times"/>
+              </a:rPr>
+              <a:t>предназначена для перехода по якорю к следующему разделу главной страницы. </a:t>
             </a:r>
             <a:endParaRPr kumimoji="1" lang="ru-RU" altLang="ja-JP" sz="1700" dirty="0">
               <a:latin typeface="Times"/>
@@ -12658,7 +12779,7 @@
           </a:bodyPr>
           <a:lstStyle/>
           <a:p>
-            <a:pPr marL="342900" indent="-342900">
+            <a:pPr marL="342900" indent="-342900" algn="just">
               <a:buFont typeface="Wingdings" charset="2"/>
               <a:buChar char="Ø"/>
             </a:pPr>
@@ -12745,7 +12866,7 @@
             </a:endParaRPr>
           </a:p>
           <a:p>
-            <a:pPr marL="285750" indent="-285750">
+            <a:pPr marL="285750" indent="-285750" algn="just">
               <a:buFont typeface="Wingdings" charset="2"/>
               <a:buChar char="Ø"/>
             </a:pPr>
@@ -13051,7 +13172,14 @@
                 <a:latin typeface="Times"/>
                 <a:cs typeface="Times"/>
               </a:rPr>
-              <a:t>и нажмите </a:t>
+              <a:t>и </a:t>
+            </a:r>
+            <a:r>
+              <a:rPr kumimoji="1" lang="ru-RU" altLang="ja-JP" sz="1700" dirty="0" smtClean="0">
+                <a:latin typeface="Times"/>
+                <a:cs typeface="Times"/>
+              </a:rPr>
+              <a:t>нажмите </a:t>
             </a:r>
             <a:r>
               <a:rPr kumimoji="1" lang="en-US" altLang="ja-JP" sz="1700" b="1" dirty="0" smtClean="0">
@@ -13065,7 +13193,21 @@
                 <a:latin typeface="Times"/>
                 <a:cs typeface="Times"/>
               </a:rPr>
-              <a:t>В данный раздел вы можете перейти с любой страницы приложения, спустившись в самый низ страницы, на которой находитесь.</a:t>
+              <a:t>В данный раздел </a:t>
+            </a:r>
+            <a:r>
+              <a:rPr kumimoji="1" lang="ru-RU" altLang="ja-JP" sz="1700" dirty="0" smtClean="0">
+                <a:latin typeface="Times"/>
+                <a:cs typeface="Times"/>
+              </a:rPr>
+              <a:t>вы также </a:t>
+            </a:r>
+            <a:r>
+              <a:rPr kumimoji="1" lang="ru-RU" altLang="ja-JP" sz="1700" dirty="0" smtClean="0">
+                <a:latin typeface="Times"/>
+                <a:cs typeface="Times"/>
+              </a:rPr>
+              <a:t>можете перейти с любой страницы приложения, спустившись в самый низ страницы, на которой находитесь.</a:t>
             </a:r>
             <a:r>
               <a:rPr kumimoji="1" lang="ru-RU" altLang="ja-JP" sz="1700" b="1" dirty="0">
@@ -13247,8 +13389,8 @@
         </p:blipFill>
         <p:spPr>
           <a:xfrm>
-            <a:off x="1780985" y="959147"/>
-            <a:ext cx="321041" cy="341106"/>
+            <a:off x="1664786" y="988748"/>
+            <a:ext cx="265323" cy="281905"/>
           </a:xfrm>
           <a:prstGeom prst="rect">
             <a:avLst/>
@@ -13389,7 +13531,7 @@
         </p:blipFill>
         <p:spPr>
           <a:xfrm>
-            <a:off x="0" y="1589862"/>
+            <a:off x="10583" y="1589862"/>
             <a:ext cx="9144000" cy="3569513"/>
           </a:xfrm>
           <a:prstGeom prst="rect">

</xml_diff>

<commit_message>
small changed in .pptx
</commit_message>
<xml_diff>
--- a/Presentation.pptx
+++ b/Presentation.pptx
@@ -214,7 +214,7 @@
           <a:p>
             <a:fld id="{553D2524-1773-F945-AFF8-021F42CECBA1}" type="datetimeFigureOut">
               <a:rPr kumimoji="1" lang="ja-JP" altLang="en-US" smtClean="0"/>
-              <a:t>09.11.15</a:t>
+              <a:t>14.11.15</a:t>
             </a:fld>
             <a:endParaRPr kumimoji="1" lang="ja-JP" altLang="en-US"/>
           </a:p>
@@ -2160,7 +2160,7 @@
             <a:fld id="{0D0EC791-D078-4631-9937-E8318C63790B}" type="datetimeFigureOut">
               <a:rPr lang="en-US" smtClean="0"/>
               <a:pPr eaLnBrk="1" latinLnBrk="0" hangingPunct="1"/>
-              <a:t>09.11.15</a:t>
+              <a:t>14.11.15</a:t>
             </a:fld>
             <a:endParaRPr lang="en-US"/>
           </a:p>
@@ -2360,7 +2360,7 @@
             <a:fld id="{0D0EC791-D078-4631-9937-E8318C63790B}" type="datetimeFigureOut">
               <a:rPr lang="en-US" smtClean="0"/>
               <a:pPr eaLnBrk="1" latinLnBrk="0" hangingPunct="1"/>
-              <a:t>09.11.15</a:t>
+              <a:t>14.11.15</a:t>
             </a:fld>
             <a:endParaRPr lang="en-US"/>
           </a:p>
@@ -2570,7 +2570,7 @@
             <a:fld id="{0D0EC791-D078-4631-9937-E8318C63790B}" type="datetimeFigureOut">
               <a:rPr lang="en-US" smtClean="0"/>
               <a:pPr eaLnBrk="1" latinLnBrk="0" hangingPunct="1"/>
-              <a:t>09.11.15</a:t>
+              <a:t>14.11.15</a:t>
             </a:fld>
             <a:endParaRPr lang="en-US"/>
           </a:p>
@@ -2770,7 +2770,7 @@
             <a:fld id="{0D0EC791-D078-4631-9937-E8318C63790B}" type="datetimeFigureOut">
               <a:rPr lang="en-US" smtClean="0"/>
               <a:pPr eaLnBrk="1" latinLnBrk="0" hangingPunct="1"/>
-              <a:t>09.11.15</a:t>
+              <a:t>14.11.15</a:t>
             </a:fld>
             <a:endParaRPr lang="en-US"/>
           </a:p>
@@ -3326,7 +3326,7 @@
             <a:fld id="{0D0EC791-D078-4631-9937-E8318C63790B}" type="datetimeFigureOut">
               <a:rPr lang="en-US" smtClean="0"/>
               <a:pPr eaLnBrk="1" latinLnBrk="0" hangingPunct="1"/>
-              <a:t>09.11.15</a:t>
+              <a:t>14.11.15</a:t>
             </a:fld>
             <a:endParaRPr lang="en-US"/>
           </a:p>
@@ -3653,7 +3653,7 @@
             <a:fld id="{0D0EC791-D078-4631-9937-E8318C63790B}" type="datetimeFigureOut">
               <a:rPr lang="en-US" smtClean="0"/>
               <a:pPr eaLnBrk="1" latinLnBrk="0" hangingPunct="1"/>
-              <a:t>09.11.15</a:t>
+              <a:t>14.11.15</a:t>
             </a:fld>
             <a:endParaRPr lang="en-US"/>
           </a:p>
@@ -4208,7 +4208,7 @@
             <a:fld id="{0D0EC791-D078-4631-9937-E8318C63790B}" type="datetimeFigureOut">
               <a:rPr lang="en-US" smtClean="0"/>
               <a:pPr eaLnBrk="1" latinLnBrk="0" hangingPunct="1"/>
-              <a:t>09.11.15</a:t>
+              <a:t>14.11.15</a:t>
             </a:fld>
             <a:endParaRPr lang="en-US"/>
           </a:p>
@@ -4324,7 +4324,7 @@
             <a:fld id="{0D0EC791-D078-4631-9937-E8318C63790B}" type="datetimeFigureOut">
               <a:rPr lang="en-US" smtClean="0"/>
               <a:pPr eaLnBrk="1" latinLnBrk="0" hangingPunct="1"/>
-              <a:t>09.11.15</a:t>
+              <a:t>14.11.15</a:t>
             </a:fld>
             <a:endParaRPr lang="en-US"/>
           </a:p>
@@ -4417,7 +4417,7 @@
             <a:fld id="{0D0EC791-D078-4631-9937-E8318C63790B}" type="datetimeFigureOut">
               <a:rPr lang="en-US" smtClean="0"/>
               <a:pPr eaLnBrk="1" latinLnBrk="0" hangingPunct="1"/>
-              <a:t>09.11.15</a:t>
+              <a:t>14.11.15</a:t>
             </a:fld>
             <a:endParaRPr lang="en-US"/>
           </a:p>
@@ -4882,7 +4882,7 @@
             <a:fld id="{0D0EC791-D078-4631-9937-E8318C63790B}" type="datetimeFigureOut">
               <a:rPr lang="en-US" smtClean="0"/>
               <a:pPr eaLnBrk="1" latinLnBrk="0" hangingPunct="1"/>
-              <a:t>09.11.15</a:t>
+              <a:t>14.11.15</a:t>
             </a:fld>
             <a:endParaRPr lang="en-US"/>
           </a:p>
@@ -5418,7 +5418,7 @@
             <a:fld id="{0D0EC791-D078-4631-9937-E8318C63790B}" type="datetimeFigureOut">
               <a:rPr lang="en-US" smtClean="0"/>
               <a:pPr eaLnBrk="1" latinLnBrk="0" hangingPunct="1"/>
-              <a:t>09.11.15</a:t>
+              <a:t>14.11.15</a:t>
             </a:fld>
             <a:endParaRPr lang="en-US"/>
           </a:p>
@@ -6293,7 +6293,7 @@
             <a:fld id="{0D0EC791-D078-4631-9937-E8318C63790B}" type="datetimeFigureOut">
               <a:rPr lang="en-US" smtClean="0"/>
               <a:pPr eaLnBrk="1" latinLnBrk="0" hangingPunct="1"/>
-              <a:t>09.11.15</a:t>
+              <a:t>14.11.15</a:t>
             </a:fld>
             <a:endParaRPr lang="en-US" dirty="0"/>
           </a:p>
@@ -8463,14 +8463,21 @@
                 <a:latin typeface="Times"/>
                 <a:cs typeface="Times"/>
               </a:rPr>
-              <a:t>Course</a:t>
+              <a:t>Courses</a:t>
+            </a:r>
+            <a:r>
+              <a:rPr kumimoji="1" lang="ja-JP" altLang="en-US" sz="1700" b="1" dirty="0" smtClean="0">
+                <a:latin typeface="Times"/>
+                <a:cs typeface="Times"/>
+              </a:rPr>
+              <a:t> </a:t>
             </a:r>
             <a:r>
               <a:rPr kumimoji="1" lang="en-US" altLang="ja-JP" sz="1700" b="1" dirty="0" smtClean="0">
                 <a:latin typeface="Times"/>
                 <a:cs typeface="Times"/>
               </a:rPr>
-              <a:t>s</a:t>
+              <a:t>by</a:t>
             </a:r>
             <a:r>
               <a:rPr kumimoji="1" lang="ja-JP" altLang="en-US" sz="1700" b="1" dirty="0" smtClean="0">
@@ -8484,7 +8491,7 @@
                 <a:latin typeface="Times"/>
                 <a:cs typeface="Times"/>
               </a:rPr>
-              <a:t>by</a:t>
+              <a:t>Name,</a:t>
             </a:r>
             <a:r>
               <a:rPr kumimoji="1" lang="ja-JP" altLang="en-US" sz="1700" b="1" dirty="0" smtClean="0">
@@ -8498,28 +8505,7 @@
                 <a:latin typeface="Times"/>
                 <a:cs typeface="Times"/>
               </a:rPr>
-              <a:t>Name,</a:t>
-            </a:r>
-            <a:r>
-              <a:rPr kumimoji="1" lang="ja-JP" altLang="en-US" sz="1700" b="1" dirty="0" smtClean="0">
-                <a:latin typeface="Times"/>
-                <a:cs typeface="Times"/>
-              </a:rPr>
-              <a:t> </a:t>
-            </a:r>
-            <a:r>
-              <a:rPr kumimoji="1" lang="en-US" altLang="ja-JP" sz="1700" b="1" dirty="0" smtClean="0">
-                <a:latin typeface="Times"/>
-                <a:cs typeface="Times"/>
-              </a:rPr>
-              <a:t>Course</a:t>
-            </a:r>
-            <a:r>
-              <a:rPr kumimoji="1" lang="en-US" altLang="ja-JP" sz="1700" b="1" dirty="0" smtClean="0">
-                <a:latin typeface="Times"/>
-                <a:cs typeface="Times"/>
-              </a:rPr>
-              <a:t>s</a:t>
+              <a:t>Courses</a:t>
             </a:r>
             <a:r>
               <a:rPr kumimoji="1" lang="ja-JP" altLang="en-US" sz="1700" b="1" dirty="0" smtClean="0">
@@ -8797,14 +8783,21 @@
                 <a:latin typeface="Times"/>
                 <a:cs typeface="Times"/>
               </a:rPr>
-              <a:t>Course</a:t>
+              <a:t>Courses</a:t>
+            </a:r>
+            <a:r>
+              <a:rPr kumimoji="1" lang="ja-JP" altLang="en-US" sz="1700" b="1" dirty="0" smtClean="0">
+                <a:latin typeface="Times"/>
+                <a:cs typeface="Times"/>
+              </a:rPr>
+              <a:t> </a:t>
             </a:r>
             <a:r>
               <a:rPr kumimoji="1" lang="en-US" altLang="ja-JP" sz="1700" b="1" dirty="0" smtClean="0">
                 <a:latin typeface="Times"/>
                 <a:cs typeface="Times"/>
               </a:rPr>
-              <a:t>s</a:t>
+              <a:t>by</a:t>
             </a:r>
             <a:r>
               <a:rPr kumimoji="1" lang="ja-JP" altLang="en-US" sz="1700" b="1" dirty="0" smtClean="0">
@@ -8818,7 +8811,7 @@
                 <a:latin typeface="Times"/>
                 <a:cs typeface="Times"/>
               </a:rPr>
-              <a:t>by</a:t>
+              <a:t>Category,</a:t>
             </a:r>
             <a:r>
               <a:rPr kumimoji="1" lang="ja-JP" altLang="en-US" sz="1700" b="1" dirty="0" smtClean="0">
@@ -8832,28 +8825,7 @@
                 <a:latin typeface="Times"/>
                 <a:cs typeface="Times"/>
               </a:rPr>
-              <a:t>Category,</a:t>
-            </a:r>
-            <a:r>
-              <a:rPr kumimoji="1" lang="ja-JP" altLang="en-US" sz="1700" b="1" dirty="0" smtClean="0">
-                <a:latin typeface="Times"/>
-                <a:cs typeface="Times"/>
-              </a:rPr>
-              <a:t> </a:t>
-            </a:r>
-            <a:r>
-              <a:rPr kumimoji="1" lang="en-US" altLang="ja-JP" sz="1700" b="1" dirty="0" smtClean="0">
-                <a:latin typeface="Times"/>
-                <a:cs typeface="Times"/>
-              </a:rPr>
-              <a:t>Course</a:t>
-            </a:r>
-            <a:r>
-              <a:rPr kumimoji="1" lang="en-US" altLang="ja-JP" sz="1700" b="1" dirty="0" smtClean="0">
-                <a:latin typeface="Times"/>
-                <a:cs typeface="Times"/>
-              </a:rPr>
-              <a:t>s</a:t>
+              <a:t>Courses</a:t>
             </a:r>
             <a:r>
               <a:rPr kumimoji="1" lang="ja-JP" altLang="en-US" sz="1700" b="1" dirty="0" smtClean="0">
@@ -9229,63 +9201,49 @@
                 <a:latin typeface="Times"/>
                 <a:cs typeface="Times"/>
               </a:rPr>
-              <a:t>Course</a:t>
+              <a:t>Courses</a:t>
+            </a:r>
+            <a:r>
+              <a:rPr kumimoji="1" lang="ja-JP" altLang="en-US" sz="1700" b="1" dirty="0" smtClean="0">
+                <a:latin typeface="Times"/>
+                <a:cs typeface="Times"/>
+              </a:rPr>
+              <a:t> </a:t>
+            </a:r>
+            <a:r>
+              <a:rPr kumimoji="1" lang="en-US" altLang="ja-JP" sz="1700" b="1" dirty="0">
+                <a:latin typeface="Times"/>
+                <a:cs typeface="Times"/>
+              </a:rPr>
+              <a:t>by</a:t>
+            </a:r>
+            <a:r>
+              <a:rPr kumimoji="1" lang="ja-JP" altLang="en-US" sz="1700" b="1" dirty="0">
+                <a:latin typeface="Times"/>
+                <a:cs typeface="Times"/>
+              </a:rPr>
+              <a:t> </a:t>
+            </a:r>
+            <a:r>
+              <a:rPr kumimoji="1" lang="en-US" altLang="ja-JP" sz="1700" b="1" dirty="0">
+                <a:latin typeface="Times"/>
+                <a:cs typeface="Times"/>
+              </a:rPr>
+              <a:t>Name,</a:t>
+            </a:r>
+            <a:r>
+              <a:rPr kumimoji="1" lang="ja-JP" altLang="en-US" sz="1700" b="1" dirty="0">
+                <a:latin typeface="Times"/>
+                <a:cs typeface="Times"/>
+              </a:rPr>
+              <a:t> </a:t>
             </a:r>
             <a:r>
               <a:rPr kumimoji="1" lang="en-US" altLang="ja-JP" sz="1700" b="1" dirty="0" smtClean="0">
                 <a:latin typeface="Times"/>
                 <a:cs typeface="Times"/>
               </a:rPr>
-              <a:t>s</a:t>
-            </a:r>
-            <a:r>
-              <a:rPr kumimoji="1" lang="ja-JP" altLang="en-US" sz="1700" b="1" dirty="0" smtClean="0">
-                <a:latin typeface="Times"/>
-                <a:cs typeface="Times"/>
-              </a:rPr>
-              <a:t> </a:t>
-            </a:r>
-            <a:r>
-              <a:rPr kumimoji="1" lang="en-US" altLang="ja-JP" sz="1700" b="1" dirty="0">
-                <a:latin typeface="Times"/>
-                <a:cs typeface="Times"/>
-              </a:rPr>
-              <a:t>by</a:t>
-            </a:r>
-            <a:r>
-              <a:rPr kumimoji="1" lang="ja-JP" altLang="en-US" sz="1700" b="1" dirty="0">
-                <a:latin typeface="Times"/>
-                <a:cs typeface="Times"/>
-              </a:rPr>
-              <a:t> </a:t>
-            </a:r>
-            <a:r>
-              <a:rPr kumimoji="1" lang="en-US" altLang="ja-JP" sz="1700" b="1" dirty="0">
-                <a:latin typeface="Times"/>
-                <a:cs typeface="Times"/>
-              </a:rPr>
-              <a:t>Name,</a:t>
-            </a:r>
-            <a:r>
-              <a:rPr kumimoji="1" lang="ja-JP" altLang="en-US" sz="1700" b="1" dirty="0">
-                <a:latin typeface="Times"/>
-                <a:cs typeface="Times"/>
-              </a:rPr>
-              <a:t> </a:t>
-            </a:r>
-            <a:r>
-              <a:rPr kumimoji="1" lang="en-US" altLang="ja-JP" sz="1700" b="1" dirty="0" smtClean="0">
-                <a:latin typeface="Times"/>
-                <a:cs typeface="Times"/>
-              </a:rPr>
-              <a:t>Course</a:t>
-            </a:r>
-            <a:r>
-              <a:rPr kumimoji="1" lang="en-US" altLang="ja-JP" sz="1700" b="1" dirty="0" smtClean="0">
-                <a:latin typeface="Times"/>
-                <a:cs typeface="Times"/>
-              </a:rPr>
-              <a:t>s</a:t>
+              <a:t>Courses</a:t>
             </a:r>
             <a:r>
               <a:rPr kumimoji="1" lang="ja-JP" altLang="en-US" sz="1700" b="1" dirty="0" smtClean="0">
@@ -9664,14 +9622,7 @@
                 <a:latin typeface="Times"/>
                 <a:cs typeface="Times"/>
               </a:rPr>
-              <a:t> </a:t>
-            </a:r>
-            <a:r>
-              <a:rPr kumimoji="1" lang="ru-RU" altLang="ja-JP" sz="1500" dirty="0" smtClean="0">
-                <a:latin typeface="Times"/>
-                <a:cs typeface="Times"/>
-              </a:rPr>
-              <a:t>новую фотографию для курса. В разделе </a:t>
+              <a:t> новую фотографию для курса. В разделе </a:t>
             </a:r>
             <a:r>
               <a:rPr kumimoji="1" lang="en-US" altLang="ja-JP" sz="1500" i="1" dirty="0" smtClean="0">
@@ -10161,10 +10112,6 @@
               </a:rPr>
               <a:t>сохранить.</a:t>
             </a:r>
-            <a:endParaRPr kumimoji="1" lang="ru-RU" altLang="ja-JP" sz="1500" dirty="0" smtClean="0">
-              <a:latin typeface="Times"/>
-              <a:cs typeface="Times"/>
-            </a:endParaRPr>
           </a:p>
           <a:p>
             <a:pPr marL="285750" indent="-285750" algn="just">
@@ -10712,70 +10659,56 @@
                 <a:latin typeface="Times"/>
                 <a:cs typeface="Times"/>
               </a:rPr>
-              <a:t>Course</a:t>
+              <a:t>Courses</a:t>
+            </a:r>
+            <a:r>
+              <a:rPr kumimoji="1" lang="ja-JP" altLang="en-US" b="1" dirty="0" smtClean="0">
+                <a:latin typeface="Times"/>
+                <a:cs typeface="Times"/>
+              </a:rPr>
+              <a:t> </a:t>
+            </a:r>
+            <a:r>
+              <a:rPr kumimoji="1" lang="en-US" altLang="ja-JP" b="1" dirty="0">
+                <a:latin typeface="Times"/>
+                <a:cs typeface="Times"/>
+              </a:rPr>
+              <a:t>by</a:t>
+            </a:r>
+            <a:r>
+              <a:rPr kumimoji="1" lang="ja-JP" altLang="en-US" b="1" dirty="0">
+                <a:latin typeface="Times"/>
+                <a:cs typeface="Times"/>
+              </a:rPr>
+              <a:t> </a:t>
+            </a:r>
+            <a:r>
+              <a:rPr kumimoji="1" lang="en-US" altLang="ja-JP" b="1" dirty="0">
+                <a:latin typeface="Times"/>
+                <a:cs typeface="Times"/>
+              </a:rPr>
+              <a:t>Name</a:t>
+            </a:r>
+            <a:r>
+              <a:rPr kumimoji="1" lang="ja-JP" altLang="en-US" b="1" dirty="0">
+                <a:latin typeface="Times"/>
+                <a:cs typeface="Times"/>
+              </a:rPr>
+              <a:t> </a:t>
+            </a:r>
+            <a:r>
+              <a:rPr kumimoji="1" lang="ru-RU" altLang="ja-JP" dirty="0">
+                <a:latin typeface="Times"/>
+                <a:cs typeface="Times"/>
+              </a:rPr>
+              <a:t>или </a:t>
             </a:r>
             <a:r>
               <a:rPr kumimoji="1" lang="en-US" altLang="ja-JP" b="1" dirty="0" smtClean="0">
                 <a:latin typeface="Times"/>
                 <a:cs typeface="Times"/>
               </a:rPr>
-              <a:t>s</a:t>
-            </a:r>
-            <a:r>
-              <a:rPr kumimoji="1" lang="ja-JP" altLang="en-US" b="1" dirty="0" smtClean="0">
-                <a:latin typeface="Times"/>
-                <a:cs typeface="Times"/>
-              </a:rPr>
-              <a:t> </a:t>
-            </a:r>
-            <a:r>
-              <a:rPr kumimoji="1" lang="en-US" altLang="ja-JP" b="1" dirty="0">
-                <a:latin typeface="Times"/>
-                <a:cs typeface="Times"/>
-              </a:rPr>
-              <a:t>by</a:t>
-            </a:r>
-            <a:r>
-              <a:rPr kumimoji="1" lang="ja-JP" altLang="en-US" b="1" dirty="0">
-                <a:latin typeface="Times"/>
-                <a:cs typeface="Times"/>
-              </a:rPr>
-              <a:t> </a:t>
-            </a:r>
-            <a:r>
-              <a:rPr kumimoji="1" lang="en-US" altLang="ja-JP" b="1" dirty="0">
-                <a:latin typeface="Times"/>
-                <a:cs typeface="Times"/>
-              </a:rPr>
-              <a:t>Name</a:t>
-            </a:r>
-            <a:r>
-              <a:rPr kumimoji="1" lang="ja-JP" altLang="en-US" b="1" dirty="0">
-                <a:latin typeface="Times"/>
-                <a:cs typeface="Times"/>
-              </a:rPr>
-              <a:t> </a:t>
-            </a:r>
-            <a:r>
-              <a:rPr kumimoji="1" lang="ru-RU" altLang="ja-JP" dirty="0">
-                <a:latin typeface="Times"/>
-                <a:cs typeface="Times"/>
-              </a:rPr>
-              <a:t>или </a:t>
-            </a:r>
-            <a:r>
-              <a:rPr kumimoji="1" lang="en-US" altLang="ja-JP" b="1" dirty="0" smtClean="0">
-                <a:latin typeface="Times"/>
-                <a:cs typeface="Times"/>
-              </a:rPr>
-              <a:t>Course</a:t>
-            </a:r>
-            <a:r>
-              <a:rPr kumimoji="1" lang="en-US" altLang="ja-JP" b="1" dirty="0" smtClean="0">
-                <a:latin typeface="Times"/>
-                <a:cs typeface="Times"/>
-              </a:rPr>
-              <a:t>s</a:t>
+              <a:t>Courses</a:t>
             </a:r>
             <a:r>
               <a:rPr kumimoji="1" lang="ja-JP" altLang="en-US" b="1" dirty="0" smtClean="0">
@@ -11112,14 +11045,7 @@
                 <a:latin typeface="Times"/>
                 <a:cs typeface="Times"/>
               </a:rPr>
-              <a:t>Subscription</a:t>
-            </a:r>
-            <a:r>
-              <a:rPr kumimoji="1" lang="en-US" altLang="ja-JP" b="1" dirty="0" smtClean="0">
-                <a:latin typeface="Times"/>
-                <a:cs typeface="Times"/>
-              </a:rPr>
-              <a:t>s</a:t>
+              <a:t>Subscriptions</a:t>
             </a:r>
             <a:r>
               <a:rPr kumimoji="1" lang="ja-JP" altLang="en-US" b="1" dirty="0" smtClean="0">
@@ -11466,7 +11392,7 @@
         <p:spPr>
           <a:xfrm>
             <a:off x="0" y="933114"/>
-            <a:ext cx="9144000" cy="2308324"/>
+            <a:ext cx="9144000" cy="2031325"/>
           </a:xfrm>
           <a:prstGeom prst="rect">
             <a:avLst/>
@@ -11478,30 +11404,7 @@
           </a:bodyPr>
           <a:lstStyle/>
           <a:p>
-            <a:pPr marL="285750" indent="-285750" algn="just">
-              <a:buFont typeface="Wingdings" charset="2"/>
-              <a:buChar char="Ø"/>
-            </a:pPr>
-            <a:r>
-              <a:rPr kumimoji="1" lang="en-US" altLang="ja-JP" b="1" dirty="0">
-                <a:latin typeface="Times"/>
-                <a:cs typeface="Times"/>
-              </a:rPr>
-              <a:t> </a:t>
-            </a:r>
-            <a:r>
-              <a:rPr kumimoji="1" lang="ru-RU" altLang="ja-JP" dirty="0" smtClean="0">
-                <a:latin typeface="Times"/>
-                <a:cs typeface="Times"/>
-              </a:rPr>
-              <a:t>Обеспечить должную безопасность для администрирования сайта.</a:t>
-            </a:r>
-          </a:p>
-          <a:p>
-            <a:pPr marL="285750" indent="-285750" algn="just">
-              <a:buFont typeface="Wingdings" charset="2"/>
-              <a:buChar char="Ø"/>
-            </a:pPr>
+            <a:pPr algn="just"/>
             <a:endParaRPr kumimoji="1" lang="ru-RU" altLang="ja-JP" dirty="0">
               <a:latin typeface="Times"/>
               <a:cs typeface="Times"/>
@@ -11818,21 +11721,7 @@
                 <a:latin typeface="Times"/>
                 <a:cs typeface="Times"/>
               </a:rPr>
-              <a:t>HTML</a:t>
-            </a:r>
-            <a:r>
-              <a:rPr lang="en-US" altLang="ja-JP" sz="2000" b="0" dirty="0" smtClean="0">
-                <a:latin typeface="Times"/>
-                <a:cs typeface="Times"/>
-              </a:rPr>
-              <a:t>5</a:t>
-            </a:r>
-            <a:r>
-              <a:rPr lang="en-US" altLang="ja-JP" sz="2000" b="0" dirty="0" smtClean="0">
-                <a:latin typeface="Times"/>
-                <a:cs typeface="Times"/>
-              </a:rPr>
-              <a:t>, CSS, </a:t>
+              <a:t>HTML5, CSS, </a:t>
             </a:r>
             <a:r>
               <a:rPr lang="en-US" altLang="ja-JP" sz="2000" b="0" dirty="0">
@@ -12602,28 +12491,7 @@
                 <a:latin typeface="Times"/>
                 <a:cs typeface="Times"/>
               </a:rPr>
-              <a:t>Стрелка          , расположенная </a:t>
-            </a:r>
-            <a:r>
-              <a:rPr kumimoji="1" lang="ru-RU" altLang="ja-JP" sz="1700" dirty="0" smtClean="0">
-                <a:latin typeface="Times"/>
-                <a:cs typeface="Times"/>
-              </a:rPr>
-              <a:t>снизу у нижнего края </a:t>
-            </a:r>
-            <a:r>
-              <a:rPr kumimoji="1" lang="ru-RU" altLang="ja-JP" sz="1700" dirty="0" smtClean="0">
-                <a:latin typeface="Times"/>
-                <a:cs typeface="Times"/>
-              </a:rPr>
-              <a:t>разделов главной страницы, </a:t>
-            </a:r>
-            <a:r>
-              <a:rPr kumimoji="1" lang="ru-RU" altLang="ja-JP" sz="1700" dirty="0" smtClean="0">
-                <a:latin typeface="Times"/>
-                <a:cs typeface="Times"/>
-              </a:rPr>
-              <a:t>предназначена для перехода по якорю к следующему разделу главной страницы. </a:t>
+              <a:t>Стрелка          , расположенная снизу у нижнего края разделов главной страницы, предназначена для перехода по якорю к следующему разделу главной страницы. </a:t>
             </a:r>
             <a:endParaRPr kumimoji="1" lang="ru-RU" altLang="ja-JP" sz="1700" dirty="0">
               <a:latin typeface="Times"/>
@@ -12999,7 +12867,28 @@
                 <a:latin typeface="Times"/>
                 <a:cs typeface="Times"/>
               </a:rPr>
-              <a:t>	- Нажав на цифру, указывающую на статистику по количеству представленных на сайте учеников, вы перейдете на </a:t>
+              <a:t>	- Нажав на цифру, указывающую на статистику по количеству представленных на сайте </a:t>
+            </a:r>
+            <a:r>
+              <a:rPr kumimoji="1" lang="ru-RU" altLang="ja-JP" sz="1700" dirty="0" smtClean="0">
+                <a:latin typeface="Times"/>
+                <a:cs typeface="Times"/>
+              </a:rPr>
+              <a:t>учителей</a:t>
+            </a:r>
+            <a:r>
+              <a:rPr kumimoji="1" lang="ru-RU" altLang="ja-JP" sz="1700" dirty="0" smtClean="0">
+                <a:latin typeface="Times"/>
+                <a:cs typeface="Times"/>
+              </a:rPr>
+              <a:t>, </a:t>
+            </a:r>
+            <a:r>
+              <a:rPr kumimoji="1" lang="ru-RU" altLang="ja-JP" sz="1700" dirty="0" smtClean="0">
+                <a:latin typeface="Times"/>
+                <a:cs typeface="Times"/>
+              </a:rPr>
+              <a:t>вы перейдете на </a:t>
             </a:r>
             <a:r>
               <a:rPr kumimoji="1" lang="ru-RU" altLang="ja-JP" sz="1700" i="1" dirty="0" smtClean="0">
@@ -13165,42 +13054,21 @@
                 <a:latin typeface="Times"/>
                 <a:cs typeface="Times"/>
               </a:rPr>
-              <a:t>и </a:t>
+              <a:t>и нажмите </a:t>
+            </a:r>
+            <a:r>
+              <a:rPr kumimoji="1" lang="en-US" altLang="ja-JP" sz="1700" b="1" dirty="0" smtClean="0">
+                <a:latin typeface="Times"/>
+                <a:cs typeface="Times"/>
+              </a:rPr>
+              <a:t>Contacts. </a:t>
             </a:r>
             <a:r>
               <a:rPr kumimoji="1" lang="ru-RU" altLang="ja-JP" sz="1700" dirty="0" smtClean="0">
                 <a:latin typeface="Times"/>
                 <a:cs typeface="Times"/>
               </a:rPr>
-              <a:t>нажмите </a:t>
-            </a:r>
-            <a:r>
-              <a:rPr kumimoji="1" lang="en-US" altLang="ja-JP" sz="1700" b="1" dirty="0" smtClean="0">
-                <a:latin typeface="Times"/>
-                <a:cs typeface="Times"/>
-              </a:rPr>
-              <a:t>Contacts. </a:t>
-            </a:r>
-            <a:r>
-              <a:rPr kumimoji="1" lang="ru-RU" altLang="ja-JP" sz="1700" dirty="0" smtClean="0">
-                <a:latin typeface="Times"/>
-                <a:cs typeface="Times"/>
-              </a:rPr>
-              <a:t>В данный раздел </a:t>
-            </a:r>
-            <a:r>
-              <a:rPr kumimoji="1" lang="ru-RU" altLang="ja-JP" sz="1700" dirty="0" smtClean="0">
-                <a:latin typeface="Times"/>
-                <a:cs typeface="Times"/>
-              </a:rPr>
-              <a:t>вы также </a:t>
-            </a:r>
-            <a:r>
-              <a:rPr kumimoji="1" lang="ru-RU" altLang="ja-JP" sz="1700" dirty="0" smtClean="0">
-                <a:latin typeface="Times"/>
-                <a:cs typeface="Times"/>
-              </a:rPr>
-              <a:t>можете перейти с любой страницы приложения, спустившись в самый низ страницы, на которой находитесь.</a:t>
+              <a:t>В данный раздел вы также можете перейти с любой страницы приложения, спустившись в самый низ страницы, на которой находитесь.</a:t>
             </a:r>
             <a:r>
               <a:rPr kumimoji="1" lang="ru-RU" altLang="ja-JP" sz="1700" b="1" dirty="0">
@@ -13382,7 +13250,7 @@
         </p:blipFill>
         <p:spPr>
           <a:xfrm>
-            <a:off x="1664786" y="988748"/>
+            <a:off x="1716102" y="988748"/>
             <a:ext cx="265323" cy="281905"/>
           </a:xfrm>
           <a:prstGeom prst="rect">

</xml_diff>